<commit_message>
[🚀Delete & Refactor] Arduino and RaspPI
</commit_message>
<xml_diff>
--- a/PinMap.pptx
+++ b/PinMap.pptx
@@ -247,7 +247,7 @@
           <a:p>
             <a:fld id="{CD4FD6FE-C676-4C10-A3FF-2DF0E222A6BC}" type="datetimeFigureOut">
               <a:rPr lang="ko-KR" altLang="en-US" smtClean="0"/>
-              <a:t>2023-08-14</a:t>
+              <a:t>2023-08-17</a:t>
             </a:fld>
             <a:endParaRPr lang="ko-KR" altLang="en-US"/>
           </a:p>
@@ -417,7 +417,7 @@
           <a:p>
             <a:fld id="{CD4FD6FE-C676-4C10-A3FF-2DF0E222A6BC}" type="datetimeFigureOut">
               <a:rPr lang="ko-KR" altLang="en-US" smtClean="0"/>
-              <a:t>2023-08-14</a:t>
+              <a:t>2023-08-17</a:t>
             </a:fld>
             <a:endParaRPr lang="ko-KR" altLang="en-US"/>
           </a:p>
@@ -597,7 +597,7 @@
           <a:p>
             <a:fld id="{CD4FD6FE-C676-4C10-A3FF-2DF0E222A6BC}" type="datetimeFigureOut">
               <a:rPr lang="ko-KR" altLang="en-US" smtClean="0"/>
-              <a:t>2023-08-14</a:t>
+              <a:t>2023-08-17</a:t>
             </a:fld>
             <a:endParaRPr lang="ko-KR" altLang="en-US"/>
           </a:p>
@@ -767,7 +767,7 @@
           <a:p>
             <a:fld id="{CD4FD6FE-C676-4C10-A3FF-2DF0E222A6BC}" type="datetimeFigureOut">
               <a:rPr lang="ko-KR" altLang="en-US" smtClean="0"/>
-              <a:t>2023-08-14</a:t>
+              <a:t>2023-08-17</a:t>
             </a:fld>
             <a:endParaRPr lang="ko-KR" altLang="en-US"/>
           </a:p>
@@ -1013,7 +1013,7 @@
           <a:p>
             <a:fld id="{CD4FD6FE-C676-4C10-A3FF-2DF0E222A6BC}" type="datetimeFigureOut">
               <a:rPr lang="ko-KR" altLang="en-US" smtClean="0"/>
-              <a:t>2023-08-14</a:t>
+              <a:t>2023-08-17</a:t>
             </a:fld>
             <a:endParaRPr lang="ko-KR" altLang="en-US"/>
           </a:p>
@@ -1245,7 +1245,7 @@
           <a:p>
             <a:fld id="{CD4FD6FE-C676-4C10-A3FF-2DF0E222A6BC}" type="datetimeFigureOut">
               <a:rPr lang="ko-KR" altLang="en-US" smtClean="0"/>
-              <a:t>2023-08-14</a:t>
+              <a:t>2023-08-17</a:t>
             </a:fld>
             <a:endParaRPr lang="ko-KR" altLang="en-US"/>
           </a:p>
@@ -1612,7 +1612,7 @@
           <a:p>
             <a:fld id="{CD4FD6FE-C676-4C10-A3FF-2DF0E222A6BC}" type="datetimeFigureOut">
               <a:rPr lang="ko-KR" altLang="en-US" smtClean="0"/>
-              <a:t>2023-08-14</a:t>
+              <a:t>2023-08-17</a:t>
             </a:fld>
             <a:endParaRPr lang="ko-KR" altLang="en-US"/>
           </a:p>
@@ -1730,7 +1730,7 @@
           <a:p>
             <a:fld id="{CD4FD6FE-C676-4C10-A3FF-2DF0E222A6BC}" type="datetimeFigureOut">
               <a:rPr lang="ko-KR" altLang="en-US" smtClean="0"/>
-              <a:t>2023-08-14</a:t>
+              <a:t>2023-08-17</a:t>
             </a:fld>
             <a:endParaRPr lang="ko-KR" altLang="en-US"/>
           </a:p>
@@ -1825,7 +1825,7 @@
           <a:p>
             <a:fld id="{CD4FD6FE-C676-4C10-A3FF-2DF0E222A6BC}" type="datetimeFigureOut">
               <a:rPr lang="ko-KR" altLang="en-US" smtClean="0"/>
-              <a:t>2023-08-14</a:t>
+              <a:t>2023-08-17</a:t>
             </a:fld>
             <a:endParaRPr lang="ko-KR" altLang="en-US"/>
           </a:p>
@@ -2102,7 +2102,7 @@
           <a:p>
             <a:fld id="{CD4FD6FE-C676-4C10-A3FF-2DF0E222A6BC}" type="datetimeFigureOut">
               <a:rPr lang="ko-KR" altLang="en-US" smtClean="0"/>
-              <a:t>2023-08-14</a:t>
+              <a:t>2023-08-17</a:t>
             </a:fld>
             <a:endParaRPr lang="ko-KR" altLang="en-US"/>
           </a:p>
@@ -2355,7 +2355,7 @@
           <a:p>
             <a:fld id="{CD4FD6FE-C676-4C10-A3FF-2DF0E222A6BC}" type="datetimeFigureOut">
               <a:rPr lang="ko-KR" altLang="en-US" smtClean="0"/>
-              <a:t>2023-08-14</a:t>
+              <a:t>2023-08-17</a:t>
             </a:fld>
             <a:endParaRPr lang="ko-KR" altLang="en-US"/>
           </a:p>
@@ -2568,7 +2568,7 @@
           <a:p>
             <a:fld id="{CD4FD6FE-C676-4C10-A3FF-2DF0E222A6BC}" type="datetimeFigureOut">
               <a:rPr lang="ko-KR" altLang="en-US" smtClean="0"/>
-              <a:t>2023-08-14</a:t>
+              <a:t>2023-08-17</a:t>
             </a:fld>
             <a:endParaRPr lang="ko-KR" altLang="en-US"/>
           </a:p>
@@ -2973,57 +2973,6 @@
           <a:chExt cx="0" cy="0"/>
         </a:xfrm>
       </p:grpSpPr>
-      <p:sp>
-        <p:nvSpPr>
-          <p:cNvPr id="54" name="TextBox 53"/>
-          <p:cNvSpPr txBox="1"/>
-          <p:nvPr/>
-        </p:nvSpPr>
-        <p:spPr>
-          <a:xfrm>
-            <a:off x="4166492" y="147406"/>
-            <a:ext cx="4078768" cy="369332"/>
-          </a:xfrm>
-          <a:prstGeom prst="rect">
-            <a:avLst/>
-          </a:prstGeom>
-          <a:solidFill>
-            <a:schemeClr val="accent3">
-              <a:lumMod val="75000"/>
-            </a:schemeClr>
-          </a:solidFill>
-        </p:spPr>
-        <p:txBody>
-          <a:bodyPr wrap="square" rtlCol="0">
-            <a:spAutoFit/>
-          </a:bodyPr>
-          <a:lstStyle/>
-          <a:p>
-            <a:pPr algn="ctr"/>
-            <a:r>
-              <a:rPr lang="en-US" altLang="ko-KR" b="1" dirty="0" smtClean="0">
-                <a:solidFill>
-                  <a:schemeClr val="bg1"/>
-                </a:solidFill>
-              </a:rPr>
-              <a:t>Hardware </a:t>
-            </a:r>
-            <a:r>
-              <a:rPr lang="ko-KR" altLang="en-US" b="1" dirty="0" smtClean="0">
-                <a:solidFill>
-                  <a:schemeClr val="bg1"/>
-                </a:solidFill>
-              </a:rPr>
-              <a:t>기능</a:t>
-            </a:r>
-            <a:endParaRPr lang="ko-KR" altLang="en-US" b="1" dirty="0">
-              <a:solidFill>
-                <a:schemeClr val="bg1"/>
-              </a:solidFill>
-            </a:endParaRPr>
-          </a:p>
-        </p:txBody>
-      </p:sp>
       <p:grpSp>
         <p:nvGrpSpPr>
           <p:cNvPr id="214" name="그룹 213"/>
@@ -7755,65 +7704,6 @@
           </a:fontRef>
         </p:style>
       </p:cxnSp>
-      <p:sp>
-        <p:nvSpPr>
-          <p:cNvPr id="345" name="TextBox 344"/>
-          <p:cNvSpPr txBox="1"/>
-          <p:nvPr/>
-        </p:nvSpPr>
-        <p:spPr>
-          <a:xfrm>
-            <a:off x="4166492" y="147406"/>
-            <a:ext cx="4078768" cy="369332"/>
-          </a:xfrm>
-          <a:prstGeom prst="rect">
-            <a:avLst/>
-          </a:prstGeom>
-          <a:solidFill>
-            <a:schemeClr val="accent3">
-              <a:lumMod val="75000"/>
-            </a:schemeClr>
-          </a:solidFill>
-        </p:spPr>
-        <p:txBody>
-          <a:bodyPr wrap="square" rtlCol="0">
-            <a:spAutoFit/>
-          </a:bodyPr>
-          <a:lstStyle/>
-          <a:p>
-            <a:pPr algn="ctr"/>
-            <a:r>
-              <a:rPr lang="en-US" altLang="ko-KR" b="1" dirty="0" smtClean="0">
-                <a:solidFill>
-                  <a:schemeClr val="bg1"/>
-                </a:solidFill>
-              </a:rPr>
-              <a:t>Hardware </a:t>
-            </a:r>
-            <a:r>
-              <a:rPr lang="ko-KR" altLang="en-US" b="1" dirty="0" smtClean="0">
-                <a:solidFill>
-                  <a:schemeClr val="bg1"/>
-                </a:solidFill>
-              </a:rPr>
-              <a:t>구성 </a:t>
-            </a:r>
-            <a:r>
-              <a:rPr lang="en-US" altLang="ko-KR" b="1" dirty="0" smtClean="0">
-                <a:solidFill>
-                  <a:schemeClr val="bg1"/>
-                </a:solidFill>
-              </a:rPr>
-              <a:t>– Desk</a:t>
-            </a:r>
-            <a:endParaRPr lang="ko-KR" altLang="en-US" b="1" dirty="0">
-              <a:solidFill>
-                <a:schemeClr val="bg1"/>
-              </a:solidFill>
-            </a:endParaRPr>
-          </a:p>
-        </p:txBody>
-      </p:sp>
     </p:spTree>
     <p:extLst>
       <p:ext uri="{BB962C8B-B14F-4D97-AF65-F5344CB8AC3E}">
@@ -10183,8 +10073,8 @@
         </p:nvSpPr>
         <p:spPr>
           <a:xfrm>
-            <a:off x="5117123" y="3056649"/>
-            <a:ext cx="1889574" cy="864719"/>
+            <a:off x="5326657" y="3768826"/>
+            <a:ext cx="2017959" cy="864719"/>
           </a:xfrm>
           <a:prstGeom prst="rect">
             <a:avLst/>
@@ -10247,7 +10137,7 @@
         </p:nvSpPr>
         <p:spPr>
           <a:xfrm>
-            <a:off x="654561" y="3053577"/>
+            <a:off x="864096" y="3765754"/>
             <a:ext cx="2165074" cy="861774"/>
           </a:xfrm>
           <a:prstGeom prst="rect">
@@ -10305,8 +10195,8 @@
         </p:nvSpPr>
         <p:spPr>
           <a:xfrm>
-            <a:off x="9304185" y="3245937"/>
-            <a:ext cx="2394886" cy="477054"/>
+            <a:off x="5051741" y="1413975"/>
+            <a:ext cx="2567789" cy="477054"/>
           </a:xfrm>
           <a:prstGeom prst="rect">
             <a:avLst/>
@@ -10372,8 +10262,8 @@
         </p:nvCxnSpPr>
         <p:spPr>
           <a:xfrm>
-            <a:off x="2819635" y="3484464"/>
-            <a:ext cx="2297488" cy="4545"/>
+            <a:off x="3029170" y="4196641"/>
+            <a:ext cx="2297487" cy="4545"/>
           </a:xfrm>
           <a:prstGeom prst="straightConnector1">
             <a:avLst/>
@@ -10403,19 +10293,288 @@
           </a:fontRef>
         </p:style>
       </p:cxnSp>
+      <p:sp>
+        <p:nvSpPr>
+          <p:cNvPr id="16" name="TextBox 15"/>
+          <p:cNvSpPr txBox="1"/>
+          <p:nvPr/>
+        </p:nvSpPr>
+        <p:spPr>
+          <a:xfrm>
+            <a:off x="3461083" y="3827309"/>
+            <a:ext cx="1428917" cy="369332"/>
+          </a:xfrm>
+          <a:prstGeom prst="rect">
+            <a:avLst/>
+          </a:prstGeom>
+          <a:noFill/>
+        </p:spPr>
+        <p:txBody>
+          <a:bodyPr wrap="none" rtlCol="0">
+            <a:spAutoFit/>
+          </a:bodyPr>
+          <a:lstStyle/>
+          <a:p>
+            <a:pPr algn="ctr"/>
+            <a:r>
+              <a:rPr lang="en-US" altLang="ko-KR" dirty="0" smtClean="0"/>
+              <a:t>Web Socket</a:t>
+            </a:r>
+            <a:endParaRPr lang="ko-KR" altLang="en-US" dirty="0"/>
+          </a:p>
+        </p:txBody>
+      </p:sp>
       <p:cxnSp>
         <p:nvCxnSpPr>
-          <p:cNvPr id="12" name="직선 화살표 연결선 11"/>
+          <p:cNvPr id="36" name="구부러진 연결선 35"/>
+          <p:cNvCxnSpPr>
+            <a:stCxn id="7" idx="2"/>
+            <a:endCxn id="6" idx="2"/>
+          </p:cNvCxnSpPr>
+          <p:nvPr/>
+        </p:nvCxnSpPr>
+        <p:spPr>
+          <a:xfrm rot="16200000" flipH="1">
+            <a:off x="4138127" y="2436034"/>
+            <a:ext cx="6017" cy="4389004"/>
+          </a:xfrm>
+          <a:prstGeom prst="curvedConnector3">
+            <a:avLst>
+              <a:gd name="adj1" fmla="val 3899235"/>
+            </a:avLst>
+          </a:prstGeom>
+          <a:ln w="19050">
+            <a:solidFill>
+              <a:schemeClr val="tx1"/>
+            </a:solidFill>
+            <a:tailEnd type="triangle" w="lg" len="lg"/>
+          </a:ln>
+        </p:spPr>
+        <p:style>
+          <a:lnRef idx="1">
+            <a:schemeClr val="accent1"/>
+          </a:lnRef>
+          <a:fillRef idx="0">
+            <a:schemeClr val="accent1"/>
+          </a:fillRef>
+          <a:effectRef idx="0">
+            <a:schemeClr val="accent1"/>
+          </a:effectRef>
+          <a:fontRef idx="minor">
+            <a:schemeClr val="tx1"/>
+          </a:fontRef>
+        </p:style>
+      </p:cxnSp>
+      <p:sp>
+        <p:nvSpPr>
+          <p:cNvPr id="44" name="TextBox 43"/>
+          <p:cNvSpPr txBox="1"/>
+          <p:nvPr/>
+        </p:nvSpPr>
+        <p:spPr>
+          <a:xfrm>
+            <a:off x="2507653" y="3095784"/>
+            <a:ext cx="3200400" cy="292388"/>
+          </a:xfrm>
+          <a:prstGeom prst="rect">
+            <a:avLst/>
+          </a:prstGeom>
+          <a:noFill/>
+        </p:spPr>
+        <p:txBody>
+          <a:bodyPr wrap="square" rtlCol="0">
+            <a:spAutoFit/>
+          </a:bodyPr>
+          <a:lstStyle/>
+          <a:p>
+            <a:pPr algn="ctr"/>
+            <a:r>
+              <a:rPr lang="en-US" altLang="ko-KR" sz="1300" dirty="0" smtClean="0"/>
+              <a:t>flag, name, distance, </a:t>
+            </a:r>
+            <a:r>
+              <a:rPr lang="en-US" altLang="ko-KR" sz="1300" dirty="0" err="1" smtClean="0"/>
+              <a:t>team_name</a:t>
+            </a:r>
+            <a:r>
+              <a:rPr lang="en-US" altLang="ko-KR" sz="1300" dirty="0" smtClean="0"/>
+              <a:t>, state</a:t>
+            </a:r>
+            <a:endParaRPr lang="ko-KR" altLang="en-US" sz="1300" dirty="0"/>
+          </a:p>
+        </p:txBody>
+      </p:sp>
+      <p:sp>
+        <p:nvSpPr>
+          <p:cNvPr id="45" name="TextBox 44"/>
+          <p:cNvSpPr txBox="1"/>
+          <p:nvPr/>
+        </p:nvSpPr>
+        <p:spPr>
+          <a:xfrm>
+            <a:off x="2916680" y="4967754"/>
+            <a:ext cx="2382347" cy="292388"/>
+          </a:xfrm>
+          <a:prstGeom prst="rect">
+            <a:avLst/>
+          </a:prstGeom>
+          <a:noFill/>
+        </p:spPr>
+        <p:txBody>
+          <a:bodyPr wrap="square" rtlCol="0">
+            <a:spAutoFit/>
+          </a:bodyPr>
+          <a:lstStyle/>
+          <a:p>
+            <a:pPr algn="ctr"/>
+            <a:r>
+              <a:rPr lang="en-US" altLang="ko-KR" sz="1300" dirty="0" smtClean="0"/>
+              <a:t>Table ID, Desk height</a:t>
+            </a:r>
+            <a:endParaRPr lang="ko-KR" altLang="en-US" sz="1300" dirty="0"/>
+          </a:p>
+        </p:txBody>
+      </p:sp>
+      <p:sp>
+        <p:nvSpPr>
+          <p:cNvPr id="57" name="TextBox 56"/>
+          <p:cNvSpPr txBox="1"/>
+          <p:nvPr/>
+        </p:nvSpPr>
+        <p:spPr>
+          <a:xfrm>
+            <a:off x="5369700" y="2459240"/>
+            <a:ext cx="734433" cy="369332"/>
+          </a:xfrm>
+          <a:prstGeom prst="rect">
+            <a:avLst/>
+          </a:prstGeom>
+          <a:noFill/>
+        </p:spPr>
+        <p:txBody>
+          <a:bodyPr wrap="none" rtlCol="0">
+            <a:spAutoFit/>
+          </a:bodyPr>
+          <a:lstStyle/>
+          <a:p>
+            <a:pPr algn="ctr"/>
+            <a:r>
+              <a:rPr lang="en-US" altLang="ko-KR" dirty="0" smtClean="0"/>
+              <a:t>HTTP</a:t>
+            </a:r>
+            <a:endParaRPr lang="ko-KR" altLang="en-US" dirty="0"/>
+          </a:p>
+        </p:txBody>
+      </p:sp>
+      <p:sp>
+        <p:nvSpPr>
+          <p:cNvPr id="58" name="TextBox 57"/>
+          <p:cNvSpPr txBox="1"/>
+          <p:nvPr/>
+        </p:nvSpPr>
+        <p:spPr>
+          <a:xfrm>
+            <a:off x="6401624" y="2497712"/>
+            <a:ext cx="867672" cy="292388"/>
+          </a:xfrm>
+          <a:prstGeom prst="rect">
+            <a:avLst/>
+          </a:prstGeom>
+          <a:noFill/>
+        </p:spPr>
+        <p:txBody>
+          <a:bodyPr wrap="square" rtlCol="0">
+            <a:spAutoFit/>
+          </a:bodyPr>
+          <a:lstStyle/>
+          <a:p>
+            <a:pPr algn="ctr"/>
+            <a:r>
+              <a:rPr lang="en-US" altLang="ko-KR" sz="1300" dirty="0" smtClean="0"/>
+              <a:t>Card ID</a:t>
+            </a:r>
+            <a:endParaRPr lang="ko-KR" altLang="en-US" sz="1300" dirty="0"/>
+          </a:p>
+        </p:txBody>
+      </p:sp>
+      <p:sp>
+        <p:nvSpPr>
+          <p:cNvPr id="31" name="TextBox 30"/>
+          <p:cNvSpPr txBox="1"/>
+          <p:nvPr/>
+        </p:nvSpPr>
+        <p:spPr>
+          <a:xfrm>
+            <a:off x="9651470" y="3754064"/>
+            <a:ext cx="2165074" cy="861774"/>
+          </a:xfrm>
+          <a:prstGeom prst="rect">
+            <a:avLst/>
+          </a:prstGeom>
+          <a:solidFill>
+            <a:schemeClr val="accent3">
+              <a:lumMod val="50000"/>
+            </a:schemeClr>
+          </a:solidFill>
+          <a:ln>
+            <a:solidFill>
+              <a:schemeClr val="accent3">
+                <a:lumMod val="50000"/>
+              </a:schemeClr>
+            </a:solidFill>
+          </a:ln>
+        </p:spPr>
+        <p:style>
+          <a:lnRef idx="2">
+            <a:schemeClr val="accent5">
+              <a:shade val="50000"/>
+            </a:schemeClr>
+          </a:lnRef>
+          <a:fillRef idx="1">
+            <a:schemeClr val="accent5"/>
+          </a:fillRef>
+          <a:effectRef idx="0">
+            <a:schemeClr val="accent5"/>
+          </a:effectRef>
+          <a:fontRef idx="minor">
+            <a:schemeClr val="lt1"/>
+          </a:fontRef>
+        </p:style>
+        <p:txBody>
+          <a:bodyPr wrap="square" rtlCol="0">
+            <a:spAutoFit/>
+          </a:bodyPr>
+          <a:lstStyle/>
+          <a:p>
+            <a:pPr algn="ctr"/>
+            <a:r>
+              <a:rPr lang="en-US" altLang="ko-KR" sz="2500" dirty="0" smtClean="0"/>
+              <a:t>APP</a:t>
+            </a:r>
+          </a:p>
+          <a:p>
+            <a:pPr algn="ctr"/>
+            <a:r>
+              <a:rPr lang="en-US" altLang="ko-KR" sz="2500" dirty="0" smtClean="0"/>
+              <a:t>(Android)</a:t>
+            </a:r>
+            <a:endParaRPr lang="ko-KR" altLang="en-US" sz="2500" dirty="0"/>
+          </a:p>
+        </p:txBody>
+      </p:sp>
+      <p:cxnSp>
+        <p:nvCxnSpPr>
+          <p:cNvPr id="32" name="직선 화살표 연결선 31"/>
           <p:cNvCxnSpPr>
             <a:stCxn id="6" idx="3"/>
-            <a:endCxn id="8" idx="1"/>
+            <a:endCxn id="31" idx="1"/>
           </p:cNvCxnSpPr>
           <p:nvPr/>
         </p:nvCxnSpPr>
         <p:spPr>
           <a:xfrm flipV="1">
-            <a:off x="7006697" y="3484464"/>
-            <a:ext cx="2297488" cy="4545"/>
+            <a:off x="7344616" y="4184951"/>
+            <a:ext cx="2306854" cy="16235"/>
           </a:xfrm>
           <a:prstGeom prst="straightConnector1">
             <a:avLst/>
@@ -10447,14 +10606,14 @@
       </p:cxnSp>
       <p:sp>
         <p:nvSpPr>
-          <p:cNvPr id="16" name="TextBox 15"/>
+          <p:cNvPr id="35" name="TextBox 34"/>
           <p:cNvSpPr txBox="1"/>
           <p:nvPr/>
         </p:nvSpPr>
         <p:spPr>
           <a:xfrm>
-            <a:off x="3251548" y="3115132"/>
-            <a:ext cx="1428917" cy="369332"/>
+            <a:off x="8172119" y="3775929"/>
+            <a:ext cx="734433" cy="369332"/>
           </a:xfrm>
           <a:prstGeom prst="rect">
             <a:avLst/>
@@ -10470,15 +10629,76 @@
             <a:pPr algn="ctr"/>
             <a:r>
               <a:rPr lang="en-US" altLang="ko-KR" dirty="0" smtClean="0"/>
-              <a:t>Web Socket</a:t>
+              <a:t>HTTP</a:t>
             </a:r>
             <a:endParaRPr lang="ko-KR" altLang="en-US" dirty="0"/>
+          </a:p>
+        </p:txBody>
+      </p:sp>
+      <p:sp>
+        <p:nvSpPr>
+          <p:cNvPr id="69" name="TextBox 68"/>
+          <p:cNvSpPr txBox="1"/>
+          <p:nvPr/>
+        </p:nvSpPr>
+        <p:spPr>
+          <a:xfrm>
+            <a:off x="7306869" y="4967754"/>
+            <a:ext cx="2382347" cy="492443"/>
+          </a:xfrm>
+          <a:prstGeom prst="rect">
+            <a:avLst/>
+          </a:prstGeom>
+          <a:noFill/>
+        </p:spPr>
+        <p:txBody>
+          <a:bodyPr wrap="square" rtlCol="0">
+            <a:spAutoFit/>
+          </a:bodyPr>
+          <a:lstStyle/>
+          <a:p>
+            <a:pPr algn="ctr"/>
+            <a:r>
+              <a:rPr lang="en-US" altLang="ko-KR" sz="1300" dirty="0" smtClean="0"/>
+              <a:t>User Information, Schedule, Seat Availability</a:t>
+            </a:r>
+            <a:endParaRPr lang="ko-KR" altLang="en-US" sz="1300" dirty="0"/>
+          </a:p>
+        </p:txBody>
+      </p:sp>
+      <p:sp>
+        <p:nvSpPr>
+          <p:cNvPr id="73" name="TextBox 72"/>
+          <p:cNvSpPr txBox="1"/>
+          <p:nvPr/>
+        </p:nvSpPr>
+        <p:spPr>
+          <a:xfrm>
+            <a:off x="6941803" y="3095784"/>
+            <a:ext cx="3200400" cy="292388"/>
+          </a:xfrm>
+          <a:prstGeom prst="rect">
+            <a:avLst/>
+          </a:prstGeom>
+          <a:noFill/>
+        </p:spPr>
+        <p:txBody>
+          <a:bodyPr wrap="square" rtlCol="0">
+            <a:spAutoFit/>
+          </a:bodyPr>
+          <a:lstStyle/>
+          <a:p>
+            <a:pPr algn="ctr"/>
+            <a:r>
+              <a:rPr lang="en-US" altLang="ko-KR" sz="1300" dirty="0" smtClean="0"/>
+              <a:t>Login, Reservation, Schedule</a:t>
+            </a:r>
           </a:p>
         </p:txBody>
       </p:sp>
       <p:cxnSp>
         <p:nvCxnSpPr>
-          <p:cNvPr id="33" name="구부러진 연결선 32"/>
+          <p:cNvPr id="80" name="구부러진 연결선 79"/>
           <p:cNvCxnSpPr>
             <a:stCxn id="6" idx="0"/>
             <a:endCxn id="7" idx="0"/>
@@ -10487,19 +10707,19 @@
         </p:nvCxnSpPr>
         <p:spPr>
           <a:xfrm rot="16200000" flipV="1">
-            <a:off x="3897968" y="892707"/>
-            <a:ext cx="3072" cy="4324812"/>
+            <a:off x="4139599" y="1572788"/>
+            <a:ext cx="3072" cy="4389004"/>
           </a:xfrm>
           <a:prstGeom prst="curvedConnector3">
             <a:avLst>
-              <a:gd name="adj1" fmla="val 13551758"/>
+              <a:gd name="adj1" fmla="val 7541406"/>
             </a:avLst>
           </a:prstGeom>
           <a:ln w="19050">
             <a:solidFill>
               <a:schemeClr val="tx1"/>
             </a:solidFill>
-            <a:tailEnd type="triangle"/>
+            <a:tailEnd type="triangle" w="lg" len="lg"/>
           </a:ln>
         </p:spPr>
         <p:style>
@@ -10519,28 +10739,28 @@
       </p:cxnSp>
       <p:cxnSp>
         <p:nvCxnSpPr>
-          <p:cNvPr id="36" name="구부러진 연결선 35"/>
+          <p:cNvPr id="84" name="구부러진 연결선 83"/>
           <p:cNvCxnSpPr>
-            <a:stCxn id="7" idx="2"/>
-            <a:endCxn id="6" idx="2"/>
+            <a:stCxn id="31" idx="0"/>
+            <a:endCxn id="6" idx="0"/>
           </p:cNvCxnSpPr>
           <p:nvPr/>
         </p:nvCxnSpPr>
         <p:spPr>
-          <a:xfrm rot="16200000" flipH="1">
-            <a:off x="3896496" y="1755953"/>
-            <a:ext cx="6017" cy="4324812"/>
+          <a:xfrm rot="16200000" flipH="1" flipV="1">
+            <a:off x="8527441" y="1562260"/>
+            <a:ext cx="14762" cy="4398370"/>
           </a:xfrm>
           <a:prstGeom prst="curvedConnector3">
             <a:avLst>
-              <a:gd name="adj1" fmla="val 5798853"/>
+              <a:gd name="adj1" fmla="val -1548571"/>
             </a:avLst>
           </a:prstGeom>
           <a:ln w="19050">
             <a:solidFill>
               <a:schemeClr val="tx1"/>
             </a:solidFill>
-            <a:tailEnd type="triangle"/>
+            <a:tailEnd type="triangle" w="lg" len="lg"/>
           </a:ln>
         </p:spPr>
         <p:style>
@@ -10558,138 +10778,88 @@
           </a:fontRef>
         </p:style>
       </p:cxnSp>
-      <p:sp>
-        <p:nvSpPr>
-          <p:cNvPr id="44" name="TextBox 43"/>
-          <p:cNvSpPr txBox="1"/>
-          <p:nvPr/>
-        </p:nvSpPr>
-        <p:spPr>
-          <a:xfrm>
-            <a:off x="2299304" y="2331838"/>
-            <a:ext cx="3200400" cy="292388"/>
-          </a:xfrm>
-          <a:prstGeom prst="rect">
+      <p:cxnSp>
+        <p:nvCxnSpPr>
+          <p:cNvPr id="89" name="구부러진 연결선 88"/>
+          <p:cNvCxnSpPr>
+            <a:stCxn id="6" idx="2"/>
+            <a:endCxn id="31" idx="2"/>
+          </p:cNvCxnSpPr>
+          <p:nvPr/>
+        </p:nvCxnSpPr>
+        <p:spPr>
+          <a:xfrm rot="5400000" flipH="1" flipV="1">
+            <a:off x="8525968" y="2425507"/>
+            <a:ext cx="17707" cy="4398370"/>
+          </a:xfrm>
+          <a:prstGeom prst="curvedConnector3">
+            <a:avLst>
+              <a:gd name="adj1" fmla="val -1291015"/>
+            </a:avLst>
+          </a:prstGeom>
+          <a:ln w="19050">
+            <a:solidFill>
+              <a:schemeClr val="tx1"/>
+            </a:solidFill>
+            <a:tailEnd type="triangle" w="lg" len="lg"/>
+          </a:ln>
+        </p:spPr>
+        <p:style>
+          <a:lnRef idx="1">
+            <a:schemeClr val="accent1"/>
+          </a:lnRef>
+          <a:fillRef idx="0">
+            <a:schemeClr val="accent1"/>
+          </a:fillRef>
+          <a:effectRef idx="0">
+            <a:schemeClr val="accent1"/>
+          </a:effectRef>
+          <a:fontRef idx="minor">
+            <a:schemeClr val="tx1"/>
+          </a:fontRef>
+        </p:style>
+      </p:cxnSp>
+      <p:cxnSp>
+        <p:nvCxnSpPr>
+          <p:cNvPr id="121" name="직선 화살표 연결선 120"/>
+          <p:cNvCxnSpPr>
+            <a:stCxn id="8" idx="2"/>
+            <a:endCxn id="6" idx="0"/>
+          </p:cNvCxnSpPr>
+          <p:nvPr/>
+        </p:nvCxnSpPr>
+        <p:spPr>
+          <a:xfrm>
+            <a:off x="6335636" y="1891029"/>
+            <a:ext cx="1" cy="1877797"/>
+          </a:xfrm>
+          <a:prstGeom prst="straightConnector1">
             <a:avLst/>
           </a:prstGeom>
-          <a:noFill/>
-        </p:spPr>
-        <p:txBody>
-          <a:bodyPr wrap="square" rtlCol="0">
-            <a:spAutoFit/>
-          </a:bodyPr>
-          <a:lstStyle/>
-          <a:p>
-            <a:pPr algn="ctr"/>
-            <a:r>
-              <a:rPr lang="en-US" altLang="ko-KR" sz="1300" dirty="0" smtClean="0"/>
-              <a:t>flag, name, distance, </a:t>
-            </a:r>
-            <a:r>
-              <a:rPr lang="en-US" altLang="ko-KR" sz="1300" dirty="0" err="1" smtClean="0"/>
-              <a:t>team_name</a:t>
-            </a:r>
-            <a:r>
-              <a:rPr lang="en-US" altLang="ko-KR" sz="1300" dirty="0" smtClean="0"/>
-              <a:t>, state</a:t>
-            </a:r>
-            <a:endParaRPr lang="ko-KR" altLang="en-US" sz="1300" dirty="0"/>
-          </a:p>
-        </p:txBody>
-      </p:sp>
-      <p:sp>
-        <p:nvSpPr>
-          <p:cNvPr id="45" name="TextBox 44"/>
-          <p:cNvSpPr txBox="1"/>
-          <p:nvPr/>
-        </p:nvSpPr>
-        <p:spPr>
-          <a:xfrm>
-            <a:off x="2707145" y="4255577"/>
-            <a:ext cx="2382347" cy="292388"/>
-          </a:xfrm>
-          <a:prstGeom prst="rect">
-            <a:avLst/>
-          </a:prstGeom>
-          <a:noFill/>
-        </p:spPr>
-        <p:txBody>
-          <a:bodyPr wrap="square" rtlCol="0">
-            <a:spAutoFit/>
-          </a:bodyPr>
-          <a:lstStyle/>
-          <a:p>
-            <a:pPr algn="ctr"/>
-            <a:r>
-              <a:rPr lang="en-US" altLang="ko-KR" sz="1300" dirty="0" smtClean="0"/>
-              <a:t>Table ID, Desk height</a:t>
-            </a:r>
-            <a:endParaRPr lang="ko-KR" altLang="en-US" sz="1300" dirty="0"/>
-          </a:p>
-        </p:txBody>
-      </p:sp>
-      <p:sp>
-        <p:nvSpPr>
-          <p:cNvPr id="57" name="TextBox 56"/>
-          <p:cNvSpPr txBox="1"/>
-          <p:nvPr/>
-        </p:nvSpPr>
-        <p:spPr>
-          <a:xfrm>
-            <a:off x="7788224" y="3115132"/>
-            <a:ext cx="734433" cy="369332"/>
-          </a:xfrm>
-          <a:prstGeom prst="rect">
-            <a:avLst/>
-          </a:prstGeom>
-          <a:noFill/>
-        </p:spPr>
-        <p:txBody>
-          <a:bodyPr wrap="none" rtlCol="0">
-            <a:spAutoFit/>
-          </a:bodyPr>
-          <a:lstStyle/>
-          <a:p>
-            <a:pPr algn="ctr"/>
-            <a:r>
-              <a:rPr lang="en-US" altLang="ko-KR" dirty="0" smtClean="0"/>
-              <a:t>HTTP</a:t>
-            </a:r>
-            <a:endParaRPr lang="ko-KR" altLang="en-US" dirty="0"/>
-          </a:p>
-        </p:txBody>
-      </p:sp>
-      <p:sp>
-        <p:nvSpPr>
-          <p:cNvPr id="58" name="TextBox 57"/>
-          <p:cNvSpPr txBox="1"/>
-          <p:nvPr/>
-        </p:nvSpPr>
-        <p:spPr>
-          <a:xfrm>
-            <a:off x="7566734" y="3469590"/>
-            <a:ext cx="1177411" cy="292388"/>
-          </a:xfrm>
-          <a:prstGeom prst="rect">
-            <a:avLst/>
-          </a:prstGeom>
-          <a:noFill/>
-        </p:spPr>
-        <p:txBody>
-          <a:bodyPr wrap="square" rtlCol="0">
-            <a:spAutoFit/>
-          </a:bodyPr>
-          <a:lstStyle/>
-          <a:p>
-            <a:pPr algn="ctr"/>
-            <a:r>
-              <a:rPr lang="en-US" altLang="ko-KR" sz="1300" dirty="0" smtClean="0"/>
-              <a:t>Card ID</a:t>
-            </a:r>
-            <a:endParaRPr lang="ko-KR" altLang="en-US" sz="1300" dirty="0"/>
-          </a:p>
-        </p:txBody>
-      </p:sp>
+          <a:ln w="15875">
+            <a:solidFill>
+              <a:schemeClr val="tx1"/>
+            </a:solidFill>
+            <a:prstDash val="sysDash"/>
+            <a:headEnd w="lg" len="lg"/>
+            <a:tailEnd type="triangle" w="lg" len="lg"/>
+          </a:ln>
+        </p:spPr>
+        <p:style>
+          <a:lnRef idx="1">
+            <a:schemeClr val="accent1"/>
+          </a:lnRef>
+          <a:fillRef idx="0">
+            <a:schemeClr val="accent1"/>
+          </a:fillRef>
+          <a:effectRef idx="0">
+            <a:schemeClr val="accent1"/>
+          </a:effectRef>
+          <a:fontRef idx="minor">
+            <a:schemeClr val="tx1"/>
+          </a:fontRef>
+        </p:style>
+      </p:cxnSp>
     </p:spTree>
     <p:extLst>
       <p:ext uri="{BB962C8B-B14F-4D97-AF65-F5344CB8AC3E}">

</xml_diff>